<commit_message>
final image basics ppt
</commit_message>
<xml_diff>
--- a/episodes/02_imageBasics/image_processing_lecture1_image_basics.pptx
+++ b/episodes/02_imageBasics/image_processing_lecture1_image_basics.pptx
@@ -213,7 +213,7 @@
           </a:lstStyle>
           <a:p>
             <a:fld id="{BB21F979-4547-4A3A-A3A2-55B2EE3424FC}" type="datetimeFigureOut">
-              <a:t>23/02/2024</a:t>
+              <a:t>08/03/2024</a:t>
             </a:fld>
             <a:endParaRPr lang="en-US"/>
           </a:p>
@@ -479,6 +479,128 @@
 </p:notesMaster>
 </file>
 
+<file path=ppt/notesSlides/notesSlide1.xml><?xml version="1.0" encoding="utf-8"?>
+<p:notes xmlns:a="http://schemas.openxmlformats.org/drawingml/2006/main" xmlns:r="http://schemas.openxmlformats.org/officeDocument/2006/relationships" xmlns:p="http://schemas.openxmlformats.org/presentationml/2006/main">
+  <p:cSld>
+    <p:spTree>
+      <p:nvGrpSpPr>
+        <p:cNvPr id="1" name=""/>
+        <p:cNvGrpSpPr/>
+        <p:nvPr/>
+      </p:nvGrpSpPr>
+      <p:grpSpPr>
+        <a:xfrm>
+          <a:off x="0" y="0"/>
+          <a:ext cx="0" cy="0"/>
+          <a:chOff x="0" y="0"/>
+          <a:chExt cx="0" cy="0"/>
+        </a:xfrm>
+      </p:grpSpPr>
+      <p:sp>
+        <p:nvSpPr>
+          <p:cNvPr id="2" name="Slide Image Placeholder 1"/>
+          <p:cNvSpPr>
+            <a:spLocks noGrp="1" noRot="1" noChangeAspect="1"/>
+          </p:cNvSpPr>
+          <p:nvPr>
+            <p:ph type="sldImg"/>
+          </p:nvPr>
+        </p:nvSpPr>
+        <p:spPr/>
+      </p:sp>
+      <p:sp>
+        <p:nvSpPr>
+          <p:cNvPr id="3" name="Notes Placeholder 2"/>
+          <p:cNvSpPr>
+            <a:spLocks noGrp="1"/>
+          </p:cNvSpPr>
+          <p:nvPr>
+            <p:ph type="body" idx="1"/>
+          </p:nvPr>
+        </p:nvSpPr>
+        <p:spPr/>
+        <p:txBody>
+          <a:bodyPr/>
+          <a:lstStyle/>
+          <a:p>
+            <a:r>
+              <a:rPr lang="en-US" dirty="0"/>
+              <a:t>Pixels can be thought of as boxes of light with different color and shade. A matrix is a math concept and an array is a computer science concept. A matrix is numbers evenly spaced  arranged in a rectangle or a cuboid (3-d equivalent to rectangle). In computing an array refers to the structure </a:t>
+            </a:r>
+            <a:r>
+              <a:rPr lang="en-US" b="0" i="0" u="sng" cap="all" dirty="0">
+                <a:solidFill>
+                  <a:srgbClr val="383838"/>
+                </a:solidFill>
+                <a:effectLst/>
+                <a:latin typeface="Mulish"/>
+              </a:rPr>
+              <a:t>IN THE COMPUTER’S MEMORY WHERE DATA IS STORED IN EVENLY SPACED </a:t>
+            </a:r>
+            <a:r>
+              <a:rPr lang="en-US" b="1" i="0" u="sng" cap="all" dirty="0">
+                <a:solidFill>
+                  <a:srgbClr val="383838"/>
+                </a:solidFill>
+                <a:effectLst/>
+                <a:latin typeface="Mulish"/>
+              </a:rPr>
+              <a:t>ELEMENTS</a:t>
+            </a:r>
+            <a:r>
+              <a:rPr lang="en-US" b="0" i="0" u="sng" cap="all" dirty="0">
+                <a:solidFill>
+                  <a:srgbClr val="383838"/>
+                </a:solidFill>
+                <a:effectLst/>
+                <a:latin typeface="Mulish"/>
+              </a:rPr>
+              <a:t>. In reality we often use these terms interchangeably.  </a:t>
+            </a:r>
+            <a:r>
+              <a:rPr lang="en-US" dirty="0"/>
+              <a:t>A bit is a binary digit, and this is how your computer stores numbers. RAM memory is in terms of megabytes, gigabytes and even terabytes…(but some medical) images are gigabytes</a:t>
+            </a:r>
+            <a:endParaRPr lang="en-NL" dirty="0"/>
+          </a:p>
+        </p:txBody>
+      </p:sp>
+      <p:sp>
+        <p:nvSpPr>
+          <p:cNvPr id="4" name="Slide Number Placeholder 3"/>
+          <p:cNvSpPr>
+            <a:spLocks noGrp="1"/>
+          </p:cNvSpPr>
+          <p:nvPr>
+            <p:ph type="sldNum" sz="quarter" idx="5"/>
+          </p:nvPr>
+        </p:nvSpPr>
+        <p:spPr/>
+        <p:txBody>
+          <a:bodyPr/>
+          <a:lstStyle/>
+          <a:p>
+            <a:fld id="{06FC52F9-905A-4EB1-B64D-BA2B735BA047}" type="slidenum">
+              <a:rPr lang="en-NL" smtClean="0"/>
+              <a:t>6</a:t>
+            </a:fld>
+            <a:endParaRPr lang="en-NL"/>
+          </a:p>
+        </p:txBody>
+      </p:sp>
+    </p:spTree>
+    <p:extLst>
+      <p:ext uri="{BB962C8B-B14F-4D97-AF65-F5344CB8AC3E}">
+        <p14:creationId xmlns:p14="http://schemas.microsoft.com/office/powerpoint/2010/main" val="3214359031"/>
+      </p:ext>
+    </p:extLst>
+  </p:cSld>
+  <p:clrMapOvr>
+    <a:masterClrMapping/>
+  </p:clrMapOvr>
+</p:notes>
+</file>
+
 <file path=ppt/slideLayouts/slideLayout1.xml><?xml version="1.0" encoding="utf-8"?>
 <p:sldLayout xmlns:a="http://schemas.openxmlformats.org/drawingml/2006/main" xmlns:r="http://schemas.openxmlformats.org/officeDocument/2006/relationships" xmlns:p="http://schemas.openxmlformats.org/presentationml/2006/main" type="title" preserve="1">
   <p:cSld name="Title Slide">
@@ -610,7 +732,7 @@
           <a:p>
             <a:fld id="{846CE7D5-CF57-46EF-B807-FDD0502418D4}" type="datetimeFigureOut">
               <a:rPr lang="en-US" smtClean="0"/>
-              <a:t>2/23/2024</a:t>
+              <a:t>3/8/2024</a:t>
             </a:fld>
             <a:endParaRPr lang="en-US"/>
           </a:p>
@@ -780,7 +902,7 @@
           <a:p>
             <a:fld id="{846CE7D5-CF57-46EF-B807-FDD0502418D4}" type="datetimeFigureOut">
               <a:rPr lang="en-US" smtClean="0"/>
-              <a:t>2/23/2024</a:t>
+              <a:t>3/8/2024</a:t>
             </a:fld>
             <a:endParaRPr lang="en-US"/>
           </a:p>
@@ -960,7 +1082,7 @@
           <a:p>
             <a:fld id="{846CE7D5-CF57-46EF-B807-FDD0502418D4}" type="datetimeFigureOut">
               <a:rPr lang="en-US" smtClean="0"/>
-              <a:t>2/23/2024</a:t>
+              <a:t>3/8/2024</a:t>
             </a:fld>
             <a:endParaRPr lang="en-US"/>
           </a:p>
@@ -2445,7 +2567,7 @@
           <a:p>
             <a:fld id="{846CE7D5-CF57-46EF-B807-FDD0502418D4}" type="datetimeFigureOut">
               <a:rPr lang="en-US" smtClean="0"/>
-              <a:t>2/23/2024</a:t>
+              <a:t>3/8/2024</a:t>
             </a:fld>
             <a:endParaRPr lang="en-US"/>
           </a:p>
@@ -4571,7 +4693,7 @@
           <a:p>
             <a:fld id="{846CE7D5-CF57-46EF-B807-FDD0502418D4}" type="datetimeFigureOut">
               <a:rPr lang="en-US" smtClean="0"/>
-              <a:t>2/23/2024</a:t>
+              <a:t>3/8/2024</a:t>
             </a:fld>
             <a:endParaRPr lang="en-US"/>
           </a:p>
@@ -6893,7 +7015,7 @@
           <a:p>
             <a:fld id="{846CE7D5-CF57-46EF-B807-FDD0502418D4}" type="datetimeFigureOut">
               <a:rPr lang="en-US" smtClean="0"/>
-              <a:t>2/23/2024</a:t>
+              <a:t>3/8/2024</a:t>
             </a:fld>
             <a:endParaRPr lang="en-US"/>
           </a:p>
@@ -8854,7 +8976,7 @@
           <a:p>
             <a:fld id="{EA730EFB-AB28-4A68-9CF2-24FEA7CF3D98}" type="datetimeFigureOut">
               <a:rPr lang="en-US" smtClean="0"/>
-              <a:t>2/23/2024</a:t>
+              <a:t>3/8/2024</a:t>
             </a:fld>
             <a:endParaRPr lang="en-US"/>
           </a:p>
@@ -9092,7 +9214,7 @@
           <a:p>
             <a:fld id="{EA730EFB-AB28-4A68-9CF2-24FEA7CF3D98}" type="datetimeFigureOut">
               <a:rPr lang="en-US" smtClean="0"/>
-              <a:t>2/23/2024</a:t>
+              <a:t>3/8/2024</a:t>
             </a:fld>
             <a:endParaRPr lang="en-US"/>
           </a:p>
@@ -9539,7 +9661,7 @@
           <a:p>
             <a:fld id="{846CE7D5-CF57-46EF-B807-FDD0502418D4}" type="datetimeFigureOut">
               <a:rPr lang="en-US" smtClean="0"/>
-              <a:t>2/23/2024</a:t>
+              <a:t>3/8/2024</a:t>
             </a:fld>
             <a:endParaRPr lang="en-US"/>
           </a:p>
@@ -9657,7 +9779,7 @@
           <a:p>
             <a:fld id="{846CE7D5-CF57-46EF-B807-FDD0502418D4}" type="datetimeFigureOut">
               <a:rPr lang="en-US" smtClean="0"/>
-              <a:t>2/23/2024</a:t>
+              <a:t>3/8/2024</a:t>
             </a:fld>
             <a:endParaRPr lang="en-US"/>
           </a:p>
@@ -9752,7 +9874,7 @@
           <a:p>
             <a:fld id="{846CE7D5-CF57-46EF-B807-FDD0502418D4}" type="datetimeFigureOut">
               <a:rPr lang="en-US" smtClean="0"/>
-              <a:t>2/23/2024</a:t>
+              <a:t>3/8/2024</a:t>
             </a:fld>
             <a:endParaRPr lang="en-US"/>
           </a:p>
@@ -10029,7 +10151,7 @@
           <a:p>
             <a:fld id="{846CE7D5-CF57-46EF-B807-FDD0502418D4}" type="datetimeFigureOut">
               <a:rPr lang="en-US" smtClean="0"/>
-              <a:t>2/23/2024</a:t>
+              <a:t>3/8/2024</a:t>
             </a:fld>
             <a:endParaRPr lang="en-US"/>
           </a:p>
@@ -10286,7 +10408,7 @@
           <a:p>
             <a:fld id="{846CE7D5-CF57-46EF-B807-FDD0502418D4}" type="datetimeFigureOut">
               <a:rPr lang="en-US" smtClean="0"/>
-              <a:t>2/23/2024</a:t>
+              <a:t>3/8/2024</a:t>
             </a:fld>
             <a:endParaRPr lang="en-US"/>
           </a:p>
@@ -10499,7 +10621,7 @@
           <a:p>
             <a:fld id="{846CE7D5-CF57-46EF-B807-FDD0502418D4}" type="datetimeFigureOut">
               <a:rPr lang="en-US" smtClean="0"/>
-              <a:t>2/23/2024</a:t>
+              <a:t>3/8/2024</a:t>
             </a:fld>
             <a:endParaRPr lang="en-US"/>
           </a:p>
@@ -20930,7 +21052,7 @@
           <p:nvPr/>
         </p:nvPicPr>
         <p:blipFill>
-          <a:blip r:embed="rId2"/>
+          <a:blip r:embed="rId3"/>
           <a:stretch>
             <a:fillRect/>
           </a:stretch>
@@ -20960,7 +21082,7 @@
           <p:nvPr/>
         </p:nvPicPr>
         <p:blipFill>
-          <a:blip r:embed="rId3"/>
+          <a:blip r:embed="rId4"/>
           <a:stretch>
             <a:fillRect/>
           </a:stretch>

</xml_diff>